<commit_message>
Updates to documentation and to build.gradle file to update versions. Added initial code for Lab05.
</commit_message>
<xml_diff>
--- a/docs/Java ULB Diagrams.pptx
+++ b/docs/Java ULB Diagrams.pptx
@@ -9,6 +9,7 @@
     <p:sldId id="257" r:id="rId3"/>
     <p:sldId id="258" r:id="rId4"/>
     <p:sldId id="259" r:id="rId5"/>
+    <p:sldId id="260" r:id="rId6"/>
   </p:sldIdLst>
   <p:sldSz cx="12192000" cy="6858000"/>
   <p:notesSz cx="6858000" cy="9144000"/>
@@ -246,7 +247,7 @@
           <a:p>
             <a:fld id="{E368026E-3E9B-4960-907A-2C0848B388A7}" type="datetimeFigureOut">
               <a:rPr lang="en-US" smtClean="0"/>
-              <a:t>3/28/2019</a:t>
+              <a:t>4/8/2019</a:t>
             </a:fld>
             <a:endParaRPr lang="en-US"/>
           </a:p>
@@ -416,7 +417,7 @@
           <a:p>
             <a:fld id="{E368026E-3E9B-4960-907A-2C0848B388A7}" type="datetimeFigureOut">
               <a:rPr lang="en-US" smtClean="0"/>
-              <a:t>3/28/2019</a:t>
+              <a:t>4/8/2019</a:t>
             </a:fld>
             <a:endParaRPr lang="en-US"/>
           </a:p>
@@ -596,7 +597,7 @@
           <a:p>
             <a:fld id="{E368026E-3E9B-4960-907A-2C0848B388A7}" type="datetimeFigureOut">
               <a:rPr lang="en-US" smtClean="0"/>
-              <a:t>3/28/2019</a:t>
+              <a:t>4/8/2019</a:t>
             </a:fld>
             <a:endParaRPr lang="en-US"/>
           </a:p>
@@ -766,7 +767,7 @@
           <a:p>
             <a:fld id="{E368026E-3E9B-4960-907A-2C0848B388A7}" type="datetimeFigureOut">
               <a:rPr lang="en-US" smtClean="0"/>
-              <a:t>3/28/2019</a:t>
+              <a:t>4/8/2019</a:t>
             </a:fld>
             <a:endParaRPr lang="en-US"/>
           </a:p>
@@ -1012,7 +1013,7 @@
           <a:p>
             <a:fld id="{E368026E-3E9B-4960-907A-2C0848B388A7}" type="datetimeFigureOut">
               <a:rPr lang="en-US" smtClean="0"/>
-              <a:t>3/28/2019</a:t>
+              <a:t>4/8/2019</a:t>
             </a:fld>
             <a:endParaRPr lang="en-US"/>
           </a:p>
@@ -1244,7 +1245,7 @@
           <a:p>
             <a:fld id="{E368026E-3E9B-4960-907A-2C0848B388A7}" type="datetimeFigureOut">
               <a:rPr lang="en-US" smtClean="0"/>
-              <a:t>3/28/2019</a:t>
+              <a:t>4/8/2019</a:t>
             </a:fld>
             <a:endParaRPr lang="en-US"/>
           </a:p>
@@ -1611,7 +1612,7 @@
           <a:p>
             <a:fld id="{E368026E-3E9B-4960-907A-2C0848B388A7}" type="datetimeFigureOut">
               <a:rPr lang="en-US" smtClean="0"/>
-              <a:t>3/28/2019</a:t>
+              <a:t>4/8/2019</a:t>
             </a:fld>
             <a:endParaRPr lang="en-US"/>
           </a:p>
@@ -1729,7 +1730,7 @@
           <a:p>
             <a:fld id="{E368026E-3E9B-4960-907A-2C0848B388A7}" type="datetimeFigureOut">
               <a:rPr lang="en-US" smtClean="0"/>
-              <a:t>3/28/2019</a:t>
+              <a:t>4/8/2019</a:t>
             </a:fld>
             <a:endParaRPr lang="en-US"/>
           </a:p>
@@ -1824,7 +1825,7 @@
           <a:p>
             <a:fld id="{E368026E-3E9B-4960-907A-2C0848B388A7}" type="datetimeFigureOut">
               <a:rPr lang="en-US" smtClean="0"/>
-              <a:t>3/28/2019</a:t>
+              <a:t>4/8/2019</a:t>
             </a:fld>
             <a:endParaRPr lang="en-US"/>
           </a:p>
@@ -2101,7 +2102,7 @@
           <a:p>
             <a:fld id="{E368026E-3E9B-4960-907A-2C0848B388A7}" type="datetimeFigureOut">
               <a:rPr lang="en-US" smtClean="0"/>
-              <a:t>3/28/2019</a:t>
+              <a:t>4/8/2019</a:t>
             </a:fld>
             <a:endParaRPr lang="en-US"/>
           </a:p>
@@ -2354,7 +2355,7 @@
           <a:p>
             <a:fld id="{E368026E-3E9B-4960-907A-2C0848B388A7}" type="datetimeFigureOut">
               <a:rPr lang="en-US" smtClean="0"/>
-              <a:t>3/28/2019</a:t>
+              <a:t>4/8/2019</a:t>
             </a:fld>
             <a:endParaRPr lang="en-US"/>
           </a:p>
@@ -2567,7 +2568,7 @@
           <a:p>
             <a:fld id="{E368026E-3E9B-4960-907A-2C0848B388A7}" type="datetimeFigureOut">
               <a:rPr lang="en-US" smtClean="0"/>
-              <a:t>3/28/2019</a:t>
+              <a:t>4/8/2019</a:t>
             </a:fld>
             <a:endParaRPr lang="en-US"/>
           </a:p>
@@ -5888,15 +5889,7 @@
                       <a:srgbClr val="FF0000"/>
                     </a:solidFill>
                   </a:rPr>
-                  <a:t>OID: </a:t>
-                </a:r>
-                <a:r>
-                  <a:rPr lang="en-US" sz="1000" dirty="0" smtClean="0">
-                    <a:solidFill>
-                      <a:srgbClr val="FF0000"/>
-                    </a:solidFill>
-                  </a:rPr>
-                  <a:t>3-3-1-8</a:t>
+                  <a:t>OID: 3-3-1-8</a:t>
                 </a:r>
                 <a:endParaRPr lang="en-US" sz="1000" dirty="0">
                   <a:solidFill>
@@ -6031,13 +6024,6 @@
                   </a:rPr>
                   <a:t>:        Tracy</a:t>
                 </a:r>
-                <a:endParaRPr lang="en-US" sz="900" dirty="0" smtClean="0">
-                  <a:solidFill>
-                    <a:schemeClr val="accent1">
-                      <a:lumMod val="50000"/>
-                    </a:schemeClr>
-                  </a:solidFill>
-                </a:endParaRPr>
               </a:p>
               <a:p>
                 <a:r>
@@ -6060,13 +6046,6 @@
                   </a:rPr>
                   <a:t>:         Michaels</a:t>
                 </a:r>
-                <a:endParaRPr lang="en-US" sz="900" dirty="0" smtClean="0">
-                  <a:solidFill>
-                    <a:schemeClr val="accent5">
-                      <a:lumMod val="75000"/>
-                    </a:schemeClr>
-                  </a:solidFill>
-                </a:endParaRPr>
               </a:p>
               <a:p>
                 <a:r>
@@ -6089,13 +6068,6 @@
                   </a:rPr>
                   <a:t>:    A</a:t>
                 </a:r>
-                <a:endParaRPr lang="en-US" sz="900" dirty="0" smtClean="0">
-                  <a:solidFill>
-                    <a:schemeClr val="accent5">
-                      <a:lumMod val="75000"/>
-                    </a:schemeClr>
-                  </a:solidFill>
-                </a:endParaRPr>
               </a:p>
               <a:p>
                 <a:endParaRPr lang="en-US" sz="900" dirty="0">
@@ -6170,13 +6142,6 @@
                   </a:rPr>
                   <a:t>}</a:t>
                 </a:r>
-                <a:endParaRPr lang="en-US" sz="900" dirty="0" smtClean="0">
-                  <a:solidFill>
-                    <a:schemeClr val="accent5">
-                      <a:lumMod val="75000"/>
-                    </a:schemeClr>
-                  </a:solidFill>
-                </a:endParaRPr>
               </a:p>
             </p:txBody>
           </p:sp>
@@ -6278,15 +6243,7 @@
                       <a:srgbClr val="FF0000"/>
                     </a:solidFill>
                   </a:rPr>
-                  <a:t>OID: </a:t>
-                </a:r>
-                <a:r>
-                  <a:rPr lang="en-US" sz="1000" dirty="0" smtClean="0">
-                    <a:solidFill>
-                      <a:srgbClr val="FF0000"/>
-                    </a:solidFill>
-                  </a:rPr>
-                  <a:t>3-3-1-12</a:t>
+                  <a:t>OID: 3-3-1-12</a:t>
                 </a:r>
                 <a:endParaRPr lang="en-US" sz="1000" dirty="0">
                   <a:solidFill>
@@ -6421,13 +6378,6 @@
                   </a:rPr>
                   <a:t>:        Diane</a:t>
                 </a:r>
-                <a:endParaRPr lang="en-US" sz="900" dirty="0" smtClean="0">
-                  <a:solidFill>
-                    <a:schemeClr val="accent1">
-                      <a:lumMod val="50000"/>
-                    </a:schemeClr>
-                  </a:solidFill>
-                </a:endParaRPr>
               </a:p>
               <a:p>
                 <a:r>
@@ -6489,13 +6439,6 @@
                   </a:rPr>
                   <a:t>:    M</a:t>
                 </a:r>
-                <a:endParaRPr lang="en-US" sz="900" dirty="0" smtClean="0">
-                  <a:solidFill>
-                    <a:schemeClr val="accent5">
-                      <a:lumMod val="75000"/>
-                    </a:schemeClr>
-                  </a:solidFill>
-                </a:endParaRPr>
               </a:p>
               <a:p>
                 <a:endParaRPr lang="en-US" sz="900" dirty="0">
@@ -6570,13 +6513,6 @@
                   </a:rPr>
                   <a:t>}</a:t>
                 </a:r>
-                <a:endParaRPr lang="en-US" sz="900" dirty="0" smtClean="0">
-                  <a:solidFill>
-                    <a:schemeClr val="accent5">
-                      <a:lumMod val="75000"/>
-                    </a:schemeClr>
-                  </a:solidFill>
-                </a:endParaRPr>
               </a:p>
             </p:txBody>
           </p:sp>
@@ -6856,13 +6792,6 @@
                   </a:rPr>
                   <a:t>:         Seth</a:t>
                 </a:r>
-                <a:endParaRPr lang="en-US" sz="900" dirty="0" smtClean="0">
-                  <a:solidFill>
-                    <a:schemeClr val="accent1">
-                      <a:lumMod val="50000"/>
-                    </a:schemeClr>
-                  </a:solidFill>
-                </a:endParaRPr>
               </a:p>
               <a:p>
                 <a:r>
@@ -6924,13 +6853,6 @@
                   </a:rPr>
                   <a:t>      B</a:t>
                 </a:r>
-                <a:endParaRPr lang="en-US" sz="900" dirty="0" smtClean="0">
-                  <a:solidFill>
-                    <a:schemeClr val="accent1">
-                      <a:lumMod val="50000"/>
-                    </a:schemeClr>
-                  </a:solidFill>
-                </a:endParaRPr>
               </a:p>
               <a:p>
                 <a:endParaRPr lang="en-US" sz="900" dirty="0">
@@ -7066,15 +6988,7 @@
                       <a:srgbClr val="FF0000"/>
                     </a:solidFill>
                   </a:rPr>
-                  <a:t>OID: </a:t>
-                </a:r>
-                <a:r>
-                  <a:rPr lang="en-US" sz="1000" dirty="0" smtClean="0">
-                    <a:solidFill>
-                      <a:srgbClr val="FF0000"/>
-                    </a:solidFill>
-                  </a:rPr>
-                  <a:t>3-3-1-4</a:t>
+                  <a:t>OID: 3-3-1-4</a:t>
                 </a:r>
                 <a:endParaRPr lang="en-US" sz="1000" dirty="0">
                   <a:solidFill>
@@ -7200,6 +7114,479 @@
     <p:extLst>
       <p:ext uri="{BB962C8B-B14F-4D97-AF65-F5344CB8AC3E}">
         <p14:creationId xmlns:p14="http://schemas.microsoft.com/office/powerpoint/2010/main" val="3664283216"/>
+      </p:ext>
+    </p:extLst>
+  </p:cSld>
+  <p:clrMapOvr>
+    <a:masterClrMapping/>
+  </p:clrMapOvr>
+</p:sld>
+</file>
+
+<file path=ppt/slides/slide5.xml><?xml version="1.0" encoding="utf-8"?>
+<p:sld xmlns:a="http://schemas.openxmlformats.org/drawingml/2006/main" xmlns:r="http://schemas.openxmlformats.org/officeDocument/2006/relationships" xmlns:p="http://schemas.openxmlformats.org/presentationml/2006/main">
+  <p:cSld>
+    <p:spTree>
+      <p:nvGrpSpPr>
+        <p:cNvPr id="1" name=""/>
+        <p:cNvGrpSpPr/>
+        <p:nvPr/>
+      </p:nvGrpSpPr>
+      <p:grpSpPr>
+        <a:xfrm>
+          <a:off x="0" y="0"/>
+          <a:ext cx="0" cy="0"/>
+          <a:chOff x="0" y="0"/>
+          <a:chExt cx="0" cy="0"/>
+        </a:xfrm>
+      </p:grpSpPr>
+      <p:sp>
+        <p:nvSpPr>
+          <p:cNvPr id="4" name="Oval 3"/>
+          <p:cNvSpPr/>
+          <p:nvPr/>
+        </p:nvSpPr>
+        <p:spPr>
+          <a:xfrm>
+            <a:off x="1584959" y="1515291"/>
+            <a:ext cx="2647406" cy="1232263"/>
+          </a:xfrm>
+          <a:prstGeom prst="ellipse">
+            <a:avLst/>
+          </a:prstGeom>
+          <a:noFill/>
+          <a:ln w="9525"/>
+        </p:spPr>
+        <p:style>
+          <a:lnRef idx="2">
+            <a:schemeClr val="accent1">
+              <a:shade val="50000"/>
+            </a:schemeClr>
+          </a:lnRef>
+          <a:fillRef idx="1">
+            <a:schemeClr val="accent1"/>
+          </a:fillRef>
+          <a:effectRef idx="0">
+            <a:schemeClr val="accent1"/>
+          </a:effectRef>
+          <a:fontRef idx="minor">
+            <a:schemeClr val="lt1"/>
+          </a:fontRef>
+        </p:style>
+        <p:txBody>
+          <a:bodyPr rot="0" spcFirstLastPara="0" vertOverflow="overflow" horzOverflow="overflow" vert="horz" wrap="square" lIns="91440" tIns="45720" rIns="91440" bIns="45720" numCol="1" spcCol="0" rtlCol="0" fromWordArt="0" anchor="ctr" anchorCtr="0" forceAA="0" compatLnSpc="1">
+            <a:prstTxWarp prst="textNoShape">
+              <a:avLst/>
+            </a:prstTxWarp>
+            <a:noAutofit/>
+          </a:bodyPr>
+          <a:lstStyle/>
+          <a:p>
+            <a:pPr algn="ctr"/>
+            <a:r>
+              <a:rPr lang="en-US" b="1" dirty="0" smtClean="0">
+                <a:solidFill>
+                  <a:schemeClr val="accent1">
+                    <a:lumMod val="50000"/>
+                  </a:schemeClr>
+                </a:solidFill>
+              </a:rPr>
+              <a:t>Person</a:t>
+            </a:r>
+          </a:p>
+          <a:p>
+            <a:r>
+              <a:rPr lang="en-US" dirty="0" err="1" smtClean="0">
+                <a:solidFill>
+                  <a:schemeClr val="accent1">
+                    <a:lumMod val="50000"/>
+                  </a:schemeClr>
+                </a:solidFill>
+              </a:rPr>
+              <a:t>LastName</a:t>
+            </a:r>
+            <a:r>
+              <a:rPr lang="en-US" dirty="0" smtClean="0">
+                <a:solidFill>
+                  <a:schemeClr val="accent1">
+                    <a:lumMod val="50000"/>
+                  </a:schemeClr>
+                </a:solidFill>
+              </a:rPr>
+              <a:t>: Doe</a:t>
+            </a:r>
+          </a:p>
+          <a:p>
+            <a:r>
+              <a:rPr lang="en-US" dirty="0" err="1" smtClean="0">
+                <a:solidFill>
+                  <a:schemeClr val="accent1">
+                    <a:lumMod val="50000"/>
+                  </a:schemeClr>
+                </a:solidFill>
+              </a:rPr>
+              <a:t>FirstName</a:t>
+            </a:r>
+            <a:r>
+              <a:rPr lang="en-US" dirty="0" smtClean="0">
+                <a:solidFill>
+                  <a:schemeClr val="accent1">
+                    <a:lumMod val="50000"/>
+                  </a:schemeClr>
+                </a:solidFill>
+              </a:rPr>
+              <a:t>: John</a:t>
+            </a:r>
+            <a:endParaRPr lang="en-US" dirty="0" smtClean="0">
+              <a:solidFill>
+                <a:schemeClr val="accent1">
+                  <a:lumMod val="50000"/>
+                </a:schemeClr>
+              </a:solidFill>
+            </a:endParaRPr>
+          </a:p>
+        </p:txBody>
+      </p:sp>
+      <p:sp>
+        <p:nvSpPr>
+          <p:cNvPr id="5" name="Oval 4"/>
+          <p:cNvSpPr/>
+          <p:nvPr/>
+        </p:nvSpPr>
+        <p:spPr>
+          <a:xfrm>
+            <a:off x="7659187" y="1249679"/>
+            <a:ext cx="3270069" cy="1763487"/>
+          </a:xfrm>
+          <a:prstGeom prst="ellipse">
+            <a:avLst/>
+          </a:prstGeom>
+          <a:noFill/>
+          <a:ln w="9525"/>
+        </p:spPr>
+        <p:style>
+          <a:lnRef idx="2">
+            <a:schemeClr val="accent1">
+              <a:shade val="50000"/>
+            </a:schemeClr>
+          </a:lnRef>
+          <a:fillRef idx="1">
+            <a:schemeClr val="accent1"/>
+          </a:fillRef>
+          <a:effectRef idx="0">
+            <a:schemeClr val="accent1"/>
+          </a:effectRef>
+          <a:fontRef idx="minor">
+            <a:schemeClr val="lt1"/>
+          </a:fontRef>
+        </p:style>
+        <p:txBody>
+          <a:bodyPr rot="0" spcFirstLastPara="0" vertOverflow="overflow" horzOverflow="overflow" vert="horz" wrap="square" lIns="91440" tIns="45720" rIns="91440" bIns="45720" numCol="1" spcCol="0" rtlCol="0" fromWordArt="0" anchor="ctr" anchorCtr="0" forceAA="0" compatLnSpc="1">
+            <a:prstTxWarp prst="textNoShape">
+              <a:avLst/>
+            </a:prstTxWarp>
+            <a:noAutofit/>
+          </a:bodyPr>
+          <a:lstStyle/>
+          <a:p>
+            <a:pPr algn="ctr"/>
+            <a:r>
+              <a:rPr lang="en-US" b="1" dirty="0" smtClean="0">
+                <a:solidFill>
+                  <a:schemeClr val="accent1">
+                    <a:lumMod val="50000"/>
+                  </a:schemeClr>
+                </a:solidFill>
+              </a:rPr>
+              <a:t>Address</a:t>
+            </a:r>
+          </a:p>
+          <a:p>
+            <a:r>
+              <a:rPr lang="en-US" dirty="0" smtClean="0">
+                <a:solidFill>
+                  <a:schemeClr val="accent1">
+                    <a:lumMod val="50000"/>
+                  </a:schemeClr>
+                </a:solidFill>
+              </a:rPr>
+              <a:t>Street: 124 Maple St.</a:t>
+            </a:r>
+          </a:p>
+          <a:p>
+            <a:r>
+              <a:rPr lang="en-US" dirty="0" smtClean="0">
+                <a:solidFill>
+                  <a:schemeClr val="accent1">
+                    <a:lumMod val="50000"/>
+                  </a:schemeClr>
+                </a:solidFill>
+              </a:rPr>
+              <a:t>City: Mt. Pleasant</a:t>
+            </a:r>
+          </a:p>
+          <a:p>
+            <a:r>
+              <a:rPr lang="en-US" dirty="0" smtClean="0">
+                <a:solidFill>
+                  <a:schemeClr val="accent1">
+                    <a:lumMod val="50000"/>
+                  </a:schemeClr>
+                </a:solidFill>
+              </a:rPr>
+              <a:t>State: MI</a:t>
+            </a:r>
+          </a:p>
+          <a:p>
+            <a:r>
+              <a:rPr lang="en-US" dirty="0" smtClean="0">
+                <a:solidFill>
+                  <a:schemeClr val="accent1">
+                    <a:lumMod val="50000"/>
+                  </a:schemeClr>
+                </a:solidFill>
+              </a:rPr>
+              <a:t>ZIP: 48858</a:t>
+            </a:r>
+            <a:endParaRPr lang="en-US" dirty="0" smtClean="0">
+              <a:solidFill>
+                <a:schemeClr val="accent1">
+                  <a:lumMod val="50000"/>
+                </a:schemeClr>
+              </a:solidFill>
+            </a:endParaRPr>
+          </a:p>
+        </p:txBody>
+      </p:sp>
+      <p:sp>
+        <p:nvSpPr>
+          <p:cNvPr id="6" name="Oval 5"/>
+          <p:cNvSpPr/>
+          <p:nvPr/>
+        </p:nvSpPr>
+        <p:spPr>
+          <a:xfrm>
+            <a:off x="4892038" y="1637210"/>
+            <a:ext cx="2170613" cy="988424"/>
+          </a:xfrm>
+          <a:prstGeom prst="ellipse">
+            <a:avLst/>
+          </a:prstGeom>
+          <a:noFill/>
+          <a:ln w="9525"/>
+        </p:spPr>
+        <p:style>
+          <a:lnRef idx="2">
+            <a:schemeClr val="accent1">
+              <a:shade val="50000"/>
+            </a:schemeClr>
+          </a:lnRef>
+          <a:fillRef idx="1">
+            <a:schemeClr val="accent1"/>
+          </a:fillRef>
+          <a:effectRef idx="0">
+            <a:schemeClr val="accent1"/>
+          </a:effectRef>
+          <a:fontRef idx="minor">
+            <a:schemeClr val="lt1"/>
+          </a:fontRef>
+        </p:style>
+        <p:txBody>
+          <a:bodyPr rot="0" spcFirstLastPara="0" vertOverflow="overflow" horzOverflow="overflow" vert="horz" wrap="square" lIns="91440" tIns="45720" rIns="91440" bIns="45720" numCol="1" spcCol="0" rtlCol="0" fromWordArt="0" anchor="ctr" anchorCtr="0" forceAA="0" compatLnSpc="1">
+            <a:prstTxWarp prst="textNoShape">
+              <a:avLst/>
+            </a:prstTxWarp>
+            <a:noAutofit/>
+          </a:bodyPr>
+          <a:lstStyle/>
+          <a:p>
+            <a:pPr algn="ctr"/>
+            <a:r>
+              <a:rPr lang="en-US" dirty="0" err="1" smtClean="0">
+                <a:solidFill>
+                  <a:schemeClr val="accent1">
+                    <a:lumMod val="50000"/>
+                  </a:schemeClr>
+                </a:solidFill>
+              </a:rPr>
+              <a:t>LivesAt</a:t>
+            </a:r>
+            <a:endParaRPr lang="en-US" dirty="0" smtClean="0">
+              <a:solidFill>
+                <a:schemeClr val="accent1">
+                  <a:lumMod val="50000"/>
+                </a:schemeClr>
+              </a:solidFill>
+            </a:endParaRPr>
+          </a:p>
+        </p:txBody>
+      </p:sp>
+      <p:cxnSp>
+        <p:nvCxnSpPr>
+          <p:cNvPr id="8" name="Straight Arrow Connector 7"/>
+          <p:cNvCxnSpPr>
+            <a:stCxn id="4" idx="6"/>
+            <a:endCxn id="6" idx="2"/>
+          </p:cNvCxnSpPr>
+          <p:nvPr/>
+        </p:nvCxnSpPr>
+        <p:spPr>
+          <a:xfrm flipV="1">
+            <a:off x="4232365" y="2131422"/>
+            <a:ext cx="659673" cy="1"/>
+          </a:xfrm>
+          <a:prstGeom prst="straightConnector1">
+            <a:avLst/>
+          </a:prstGeom>
+          <a:ln w="57150">
+            <a:tailEnd type="triangle"/>
+          </a:ln>
+        </p:spPr>
+        <p:style>
+          <a:lnRef idx="1">
+            <a:schemeClr val="accent1"/>
+          </a:lnRef>
+          <a:fillRef idx="0">
+            <a:schemeClr val="accent1"/>
+          </a:fillRef>
+          <a:effectRef idx="0">
+            <a:schemeClr val="accent1"/>
+          </a:effectRef>
+          <a:fontRef idx="minor">
+            <a:schemeClr val="tx1"/>
+          </a:fontRef>
+        </p:style>
+      </p:cxnSp>
+      <p:cxnSp>
+        <p:nvCxnSpPr>
+          <p:cNvPr id="10" name="Straight Arrow Connector 9"/>
+          <p:cNvCxnSpPr>
+            <a:stCxn id="6" idx="6"/>
+            <a:endCxn id="5" idx="2"/>
+          </p:cNvCxnSpPr>
+          <p:nvPr/>
+        </p:nvCxnSpPr>
+        <p:spPr>
+          <a:xfrm>
+            <a:off x="7062651" y="2131422"/>
+            <a:ext cx="596536" cy="1"/>
+          </a:xfrm>
+          <a:prstGeom prst="straightConnector1">
+            <a:avLst/>
+          </a:prstGeom>
+          <a:ln w="57150">
+            <a:tailEnd type="triangle"/>
+          </a:ln>
+        </p:spPr>
+        <p:style>
+          <a:lnRef idx="1">
+            <a:schemeClr val="accent1"/>
+          </a:lnRef>
+          <a:fillRef idx="0">
+            <a:schemeClr val="accent1"/>
+          </a:fillRef>
+          <a:effectRef idx="0">
+            <a:schemeClr val="accent1"/>
+          </a:effectRef>
+          <a:fontRef idx="minor">
+            <a:schemeClr val="tx1"/>
+          </a:fontRef>
+        </p:style>
+      </p:cxnSp>
+      <p:sp>
+        <p:nvSpPr>
+          <p:cNvPr id="13" name="TextBox 12"/>
+          <p:cNvSpPr txBox="1"/>
+          <p:nvPr/>
+        </p:nvSpPr>
+        <p:spPr>
+          <a:xfrm>
+            <a:off x="2515670" y="880347"/>
+            <a:ext cx="692818" cy="369332"/>
+          </a:xfrm>
+          <a:prstGeom prst="rect">
+            <a:avLst/>
+          </a:prstGeom>
+          <a:noFill/>
+        </p:spPr>
+        <p:txBody>
+          <a:bodyPr wrap="none" rtlCol="0">
+            <a:spAutoFit/>
+          </a:bodyPr>
+          <a:lstStyle/>
+          <a:p>
+            <a:r>
+              <a:rPr lang="en-US" dirty="0" smtClean="0"/>
+              <a:t>Node</a:t>
+            </a:r>
+            <a:endParaRPr lang="en-US" dirty="0"/>
+          </a:p>
+        </p:txBody>
+      </p:sp>
+      <p:sp>
+        <p:nvSpPr>
+          <p:cNvPr id="14" name="TextBox 13"/>
+          <p:cNvSpPr txBox="1"/>
+          <p:nvPr/>
+        </p:nvSpPr>
+        <p:spPr>
+          <a:xfrm>
+            <a:off x="8901229" y="880347"/>
+            <a:ext cx="692818" cy="369332"/>
+          </a:xfrm>
+          <a:prstGeom prst="rect">
+            <a:avLst/>
+          </a:prstGeom>
+          <a:noFill/>
+        </p:spPr>
+        <p:txBody>
+          <a:bodyPr wrap="none" rtlCol="0">
+            <a:spAutoFit/>
+          </a:bodyPr>
+          <a:lstStyle/>
+          <a:p>
+            <a:r>
+              <a:rPr lang="en-US"/>
+              <a:t>Node</a:t>
+            </a:r>
+            <a:endParaRPr lang="en-US" dirty="0"/>
+          </a:p>
+        </p:txBody>
+      </p:sp>
+      <p:sp>
+        <p:nvSpPr>
+          <p:cNvPr id="15" name="TextBox 14"/>
+          <p:cNvSpPr txBox="1"/>
+          <p:nvPr/>
+        </p:nvSpPr>
+        <p:spPr>
+          <a:xfrm>
+            <a:off x="5658442" y="880347"/>
+            <a:ext cx="637803" cy="369332"/>
+          </a:xfrm>
+          <a:prstGeom prst="rect">
+            <a:avLst/>
+          </a:prstGeom>
+          <a:noFill/>
+        </p:spPr>
+        <p:txBody>
+          <a:bodyPr wrap="none" rtlCol="0">
+            <a:spAutoFit/>
+          </a:bodyPr>
+          <a:lstStyle/>
+          <a:p>
+            <a:r>
+              <a:rPr lang="en-US" dirty="0" smtClean="0"/>
+              <a:t>Edge</a:t>
+            </a:r>
+            <a:endParaRPr lang="en-US" dirty="0"/>
+          </a:p>
+        </p:txBody>
+      </p:sp>
+    </p:spTree>
+    <p:extLst>
+      <p:ext uri="{BB962C8B-B14F-4D97-AF65-F5344CB8AC3E}">
+        <p14:creationId xmlns:p14="http://schemas.microsoft.com/office/powerpoint/2010/main" val="4286534608"/>
       </p:ext>
     </p:extLst>
   </p:cSld>
@@ -7500,6 +7887,29 @@
         </a:fontRef>
       </a:style>
     </a:spDef>
+    <a:lnDef>
+      <a:spPr>
+        <a:ln w="57150">
+          <a:tailEnd type="triangle"/>
+        </a:ln>
+      </a:spPr>
+      <a:bodyPr/>
+      <a:lstStyle/>
+      <a:style>
+        <a:lnRef idx="1">
+          <a:schemeClr val="accent1"/>
+        </a:lnRef>
+        <a:fillRef idx="0">
+          <a:schemeClr val="accent1"/>
+        </a:fillRef>
+        <a:effectRef idx="0">
+          <a:schemeClr val="accent1"/>
+        </a:effectRef>
+        <a:fontRef idx="minor">
+          <a:schemeClr val="tx1"/>
+        </a:fontRef>
+      </a:style>
+    </a:lnDef>
   </a:objectDefaults>
   <a:extraClrSchemeLst/>
   <a:extLst>

</xml_diff>

<commit_message>
Conversion to IG 2022.1
</commit_message>
<xml_diff>
--- a/docs/Java ULB Diagrams.pptx
+++ b/docs/Java ULB Diagrams.pptx
@@ -17,6 +17,7 @@
     <p:sldId id="264" r:id="rId11"/>
     <p:sldId id="266" r:id="rId12"/>
     <p:sldId id="267" r:id="rId13"/>
+    <p:sldId id="268" r:id="rId14"/>
   </p:sldIdLst>
   <p:sldSz cx="12192000" cy="6858000"/>
   <p:notesSz cx="6858000" cy="9144000"/>
@@ -254,7 +255,7 @@
           <a:p>
             <a:fld id="{E368026E-3E9B-4960-907A-2C0848B388A7}" type="datetimeFigureOut">
               <a:rPr lang="en-US" smtClean="0"/>
-              <a:t>1/16/2020</a:t>
+              <a:t>5/4/2020</a:t>
             </a:fld>
             <a:endParaRPr lang="en-US"/>
           </a:p>
@@ -424,7 +425,7 @@
           <a:p>
             <a:fld id="{E368026E-3E9B-4960-907A-2C0848B388A7}" type="datetimeFigureOut">
               <a:rPr lang="en-US" smtClean="0"/>
-              <a:t>1/16/2020</a:t>
+              <a:t>5/4/2020</a:t>
             </a:fld>
             <a:endParaRPr lang="en-US"/>
           </a:p>
@@ -604,7 +605,7 @@
           <a:p>
             <a:fld id="{E368026E-3E9B-4960-907A-2C0848B388A7}" type="datetimeFigureOut">
               <a:rPr lang="en-US" smtClean="0"/>
-              <a:t>1/16/2020</a:t>
+              <a:t>5/4/2020</a:t>
             </a:fld>
             <a:endParaRPr lang="en-US"/>
           </a:p>
@@ -774,7 +775,7 @@
           <a:p>
             <a:fld id="{E368026E-3E9B-4960-907A-2C0848B388A7}" type="datetimeFigureOut">
               <a:rPr lang="en-US" smtClean="0"/>
-              <a:t>1/16/2020</a:t>
+              <a:t>5/4/2020</a:t>
             </a:fld>
             <a:endParaRPr lang="en-US"/>
           </a:p>
@@ -1020,7 +1021,7 @@
           <a:p>
             <a:fld id="{E368026E-3E9B-4960-907A-2C0848B388A7}" type="datetimeFigureOut">
               <a:rPr lang="en-US" smtClean="0"/>
-              <a:t>1/16/2020</a:t>
+              <a:t>5/4/2020</a:t>
             </a:fld>
             <a:endParaRPr lang="en-US"/>
           </a:p>
@@ -1252,7 +1253,7 @@
           <a:p>
             <a:fld id="{E368026E-3E9B-4960-907A-2C0848B388A7}" type="datetimeFigureOut">
               <a:rPr lang="en-US" smtClean="0"/>
-              <a:t>1/16/2020</a:t>
+              <a:t>5/4/2020</a:t>
             </a:fld>
             <a:endParaRPr lang="en-US"/>
           </a:p>
@@ -1619,7 +1620,7 @@
           <a:p>
             <a:fld id="{E368026E-3E9B-4960-907A-2C0848B388A7}" type="datetimeFigureOut">
               <a:rPr lang="en-US" smtClean="0"/>
-              <a:t>1/16/2020</a:t>
+              <a:t>5/4/2020</a:t>
             </a:fld>
             <a:endParaRPr lang="en-US"/>
           </a:p>
@@ -1737,7 +1738,7 @@
           <a:p>
             <a:fld id="{E368026E-3E9B-4960-907A-2C0848B388A7}" type="datetimeFigureOut">
               <a:rPr lang="en-US" smtClean="0"/>
-              <a:t>1/16/2020</a:t>
+              <a:t>5/4/2020</a:t>
             </a:fld>
             <a:endParaRPr lang="en-US"/>
           </a:p>
@@ -1832,7 +1833,7 @@
           <a:p>
             <a:fld id="{E368026E-3E9B-4960-907A-2C0848B388A7}" type="datetimeFigureOut">
               <a:rPr lang="en-US" smtClean="0"/>
-              <a:t>1/16/2020</a:t>
+              <a:t>5/4/2020</a:t>
             </a:fld>
             <a:endParaRPr lang="en-US"/>
           </a:p>
@@ -2109,7 +2110,7 @@
           <a:p>
             <a:fld id="{E368026E-3E9B-4960-907A-2C0848B388A7}" type="datetimeFigureOut">
               <a:rPr lang="en-US" smtClean="0"/>
-              <a:t>1/16/2020</a:t>
+              <a:t>5/4/2020</a:t>
             </a:fld>
             <a:endParaRPr lang="en-US"/>
           </a:p>
@@ -2362,7 +2363,7 @@
           <a:p>
             <a:fld id="{E368026E-3E9B-4960-907A-2C0848B388A7}" type="datetimeFigureOut">
               <a:rPr lang="en-US" smtClean="0"/>
-              <a:t>1/16/2020</a:t>
+              <a:t>5/4/2020</a:t>
             </a:fld>
             <a:endParaRPr lang="en-US"/>
           </a:p>
@@ -2575,7 +2576,7 @@
           <a:p>
             <a:fld id="{E368026E-3E9B-4960-907A-2C0848B388A7}" type="datetimeFigureOut">
               <a:rPr lang="en-US" smtClean="0"/>
-              <a:t>1/16/2020</a:t>
+              <a:t>5/4/2020</a:t>
             </a:fld>
             <a:endParaRPr lang="en-US"/>
           </a:p>
@@ -3981,13 +3982,6 @@
               </a:rPr>
               <a:t>Walk</a:t>
             </a:r>
-            <a:endParaRPr lang="en-US" dirty="0" smtClean="0">
-              <a:solidFill>
-                <a:schemeClr val="accent1">
-                  <a:lumMod val="50000"/>
-                </a:schemeClr>
-              </a:solidFill>
-            </a:endParaRPr>
           </a:p>
         </p:txBody>
       </p:sp>
@@ -4267,13 +4261,6 @@
               </a:rPr>
               <a:t>     to</a:t>
             </a:r>
-            <a:endParaRPr lang="en-US" dirty="0" smtClean="0">
-              <a:solidFill>
-                <a:schemeClr val="accent1">
-                  <a:lumMod val="50000"/>
-                </a:schemeClr>
-              </a:solidFill>
-            </a:endParaRPr>
           </a:p>
         </p:txBody>
       </p:sp>
@@ -4815,13 +4802,6 @@
                 </a:rPr>
                 <a:t>            to</a:t>
               </a:r>
-              <a:endParaRPr lang="en-US" sz="900" b="1" dirty="0" smtClean="0">
-                <a:solidFill>
-                  <a:schemeClr val="accent1">
-                    <a:lumMod val="50000"/>
-                  </a:schemeClr>
-                </a:solidFill>
-              </a:endParaRPr>
             </a:p>
           </p:txBody>
         </p:sp>
@@ -5118,13 +5098,6 @@
                 </a:rPr>
                 <a:t>            to</a:t>
               </a:r>
-              <a:endParaRPr lang="en-US" sz="900" b="1" dirty="0" smtClean="0">
-                <a:solidFill>
-                  <a:schemeClr val="accent1">
-                    <a:lumMod val="50000"/>
-                  </a:schemeClr>
-                </a:solidFill>
-              </a:endParaRPr>
             </a:p>
           </p:txBody>
         </p:sp>
@@ -5848,6 +5821,1012 @@
     <p:extLst>
       <p:ext uri="{BB962C8B-B14F-4D97-AF65-F5344CB8AC3E}">
         <p14:creationId xmlns:p14="http://schemas.microsoft.com/office/powerpoint/2010/main" val="25411552"/>
+      </p:ext>
+    </p:extLst>
+  </p:cSld>
+  <p:clrMapOvr>
+    <a:masterClrMapping/>
+  </p:clrMapOvr>
+</p:sld>
+</file>
+
+<file path=ppt/slides/slide13.xml><?xml version="1.0" encoding="utf-8"?>
+<p:sld xmlns:a="http://schemas.openxmlformats.org/drawingml/2006/main" xmlns:r="http://schemas.openxmlformats.org/officeDocument/2006/relationships" xmlns:p="http://schemas.openxmlformats.org/presentationml/2006/main">
+  <p:cSld>
+    <p:spTree>
+      <p:nvGrpSpPr>
+        <p:cNvPr id="1" name=""/>
+        <p:cNvGrpSpPr/>
+        <p:nvPr/>
+      </p:nvGrpSpPr>
+      <p:grpSpPr>
+        <a:xfrm>
+          <a:off x="0" y="0"/>
+          <a:ext cx="0" cy="0"/>
+          <a:chOff x="0" y="0"/>
+          <a:chExt cx="0" cy="0"/>
+        </a:xfrm>
+      </p:grpSpPr>
+      <p:grpSp>
+        <p:nvGrpSpPr>
+          <p:cNvPr id="23" name="Group 22"/>
+          <p:cNvGrpSpPr/>
+          <p:nvPr/>
+        </p:nvGrpSpPr>
+        <p:grpSpPr>
+          <a:xfrm>
+            <a:off x="1288676" y="1456443"/>
+            <a:ext cx="5255560" cy="2066686"/>
+            <a:chOff x="1288675" y="1456443"/>
+            <a:chExt cx="6089275" cy="2729054"/>
+          </a:xfrm>
+        </p:grpSpPr>
+        <p:grpSp>
+          <p:nvGrpSpPr>
+            <p:cNvPr id="9" name="Group 8"/>
+            <p:cNvGrpSpPr/>
+            <p:nvPr/>
+          </p:nvGrpSpPr>
+          <p:grpSpPr>
+            <a:xfrm>
+              <a:off x="5143497" y="1535053"/>
+              <a:ext cx="2234453" cy="1195444"/>
+              <a:chOff x="4838700" y="1135380"/>
+              <a:chExt cx="1226820" cy="708660"/>
+            </a:xfrm>
+          </p:grpSpPr>
+          <p:sp>
+            <p:nvSpPr>
+              <p:cNvPr id="6" name="Rectangle 5"/>
+              <p:cNvSpPr/>
+              <p:nvPr/>
+            </p:nvSpPr>
+            <p:spPr>
+              <a:xfrm>
+                <a:off x="4838700" y="1335845"/>
+                <a:ext cx="1226820" cy="508195"/>
+              </a:xfrm>
+              <a:prstGeom prst="rect">
+                <a:avLst/>
+              </a:prstGeom>
+              <a:noFill/>
+              <a:ln w="19050"/>
+            </p:spPr>
+            <p:style>
+              <a:lnRef idx="2">
+                <a:schemeClr val="accent1">
+                  <a:shade val="50000"/>
+                </a:schemeClr>
+              </a:lnRef>
+              <a:fillRef idx="1">
+                <a:schemeClr val="accent1"/>
+              </a:fillRef>
+              <a:effectRef idx="0">
+                <a:schemeClr val="accent1"/>
+              </a:effectRef>
+              <a:fontRef idx="minor">
+                <a:schemeClr val="lt1"/>
+              </a:fontRef>
+            </p:style>
+            <p:txBody>
+              <a:bodyPr rot="0" spcFirstLastPara="0" vertOverflow="overflow" horzOverflow="overflow" vert="horz" wrap="square" lIns="91440" tIns="45720" rIns="91440" bIns="45720" numCol="1" spcCol="0" rtlCol="0" fromWordArt="0" anchor="t" anchorCtr="0" forceAA="0" compatLnSpc="1">
+                <a:prstTxWarp prst="textNoShape">
+                  <a:avLst/>
+                </a:prstTxWarp>
+                <a:noAutofit/>
+              </a:bodyPr>
+              <a:lstStyle/>
+              <a:p>
+                <a:r>
+                  <a:rPr lang="en-US" sz="800" dirty="0" smtClean="0">
+                    <a:solidFill>
+                      <a:schemeClr val="accent1">
+                        <a:lumMod val="50000"/>
+                      </a:schemeClr>
+                    </a:solidFill>
+                  </a:rPr>
+                  <a:t>Key:  “</a:t>
+                </a:r>
+                <a:r>
+                  <a:rPr lang="en-US" sz="800" dirty="0" err="1" smtClean="0">
+                    <a:solidFill>
+                      <a:schemeClr val="accent1">
+                        <a:lumMod val="50000"/>
+                      </a:schemeClr>
+                    </a:solidFill>
+                  </a:rPr>
+                  <a:t>AKey</a:t>
+                </a:r>
+                <a:r>
+                  <a:rPr lang="en-US" sz="800" dirty="0" smtClean="0">
+                    <a:solidFill>
+                      <a:schemeClr val="accent1">
+                        <a:lumMod val="50000"/>
+                      </a:schemeClr>
+                    </a:solidFill>
+                  </a:rPr>
+                  <a:t>”</a:t>
+                </a:r>
+              </a:p>
+              <a:p>
+                <a:r>
+                  <a:rPr lang="en-US" sz="800" dirty="0" smtClean="0">
+                    <a:solidFill>
+                      <a:schemeClr val="accent1">
+                        <a:lumMod val="50000"/>
+                      </a:schemeClr>
+                    </a:solidFill>
+                  </a:rPr>
+                  <a:t>Value: “</a:t>
+                </a:r>
+                <a:r>
+                  <a:rPr lang="en-US" sz="800" dirty="0" err="1" smtClean="0">
+                    <a:solidFill>
+                      <a:schemeClr val="accent1">
+                        <a:lumMod val="50000"/>
+                      </a:schemeClr>
+                    </a:solidFill>
+                  </a:rPr>
+                  <a:t>Avalue</a:t>
+                </a:r>
+                <a:r>
+                  <a:rPr lang="en-US" sz="800" dirty="0" smtClean="0">
+                    <a:solidFill>
+                      <a:schemeClr val="accent1">
+                        <a:lumMod val="50000"/>
+                      </a:schemeClr>
+                    </a:solidFill>
+                  </a:rPr>
+                  <a:t>”</a:t>
+                </a:r>
+                <a:endParaRPr lang="en-US" sz="800" dirty="0" smtClean="0">
+                  <a:solidFill>
+                    <a:schemeClr val="accent1">
+                      <a:lumMod val="50000"/>
+                    </a:schemeClr>
+                  </a:solidFill>
+                </a:endParaRPr>
+              </a:p>
+            </p:txBody>
+          </p:sp>
+          <p:sp>
+            <p:nvSpPr>
+              <p:cNvPr id="7" name="Rectangle 6"/>
+              <p:cNvSpPr/>
+              <p:nvPr/>
+            </p:nvSpPr>
+            <p:spPr>
+              <a:xfrm>
+                <a:off x="4838700" y="1135380"/>
+                <a:ext cx="1226820" cy="200465"/>
+              </a:xfrm>
+              <a:prstGeom prst="rect">
+                <a:avLst/>
+              </a:prstGeom>
+              <a:noFill/>
+              <a:ln w="19050"/>
+            </p:spPr>
+            <p:style>
+              <a:lnRef idx="2">
+                <a:schemeClr val="accent1">
+                  <a:shade val="50000"/>
+                </a:schemeClr>
+              </a:lnRef>
+              <a:fillRef idx="1">
+                <a:schemeClr val="accent1"/>
+              </a:fillRef>
+              <a:effectRef idx="0">
+                <a:schemeClr val="accent1"/>
+              </a:effectRef>
+              <a:fontRef idx="minor">
+                <a:schemeClr val="lt1"/>
+              </a:fontRef>
+            </p:style>
+            <p:txBody>
+              <a:bodyPr rot="0" spcFirstLastPara="0" vertOverflow="overflow" horzOverflow="overflow" vert="horz" wrap="square" lIns="91440" tIns="45720" rIns="91440" bIns="45720" numCol="1" spcCol="0" rtlCol="0" fromWordArt="0" anchor="ctr" anchorCtr="0" forceAA="0" compatLnSpc="1">
+                <a:prstTxWarp prst="textNoShape">
+                  <a:avLst/>
+                </a:prstTxWarp>
+                <a:noAutofit/>
+              </a:bodyPr>
+              <a:lstStyle/>
+              <a:p>
+                <a:r>
+                  <a:rPr lang="en-US" sz="800" dirty="0" err="1" smtClean="0">
+                    <a:solidFill>
+                      <a:schemeClr val="accent1">
+                        <a:lumMod val="50000"/>
+                      </a:schemeClr>
+                    </a:solidFill>
+                  </a:rPr>
+                  <a:t>KVPair</a:t>
+                </a:r>
+                <a:r>
+                  <a:rPr lang="en-US" sz="800" dirty="0" smtClean="0">
+                    <a:solidFill>
+                      <a:schemeClr val="accent1">
+                        <a:lumMod val="50000"/>
+                      </a:schemeClr>
+                    </a:solidFill>
+                  </a:rPr>
+                  <a:t>	OID:  3-2-4-10</a:t>
+                </a:r>
+                <a:endParaRPr lang="en-US" sz="800" dirty="0" smtClean="0">
+                  <a:solidFill>
+                    <a:schemeClr val="accent1">
+                      <a:lumMod val="50000"/>
+                    </a:schemeClr>
+                  </a:solidFill>
+                </a:endParaRPr>
+              </a:p>
+            </p:txBody>
+          </p:sp>
+        </p:grpSp>
+        <p:grpSp>
+          <p:nvGrpSpPr>
+            <p:cNvPr id="13" name="Group 12"/>
+            <p:cNvGrpSpPr/>
+            <p:nvPr/>
+          </p:nvGrpSpPr>
+          <p:grpSpPr>
+            <a:xfrm>
+              <a:off x="5143496" y="2990053"/>
+              <a:ext cx="2234453" cy="1195444"/>
+              <a:chOff x="4838700" y="1135380"/>
+              <a:chExt cx="1226820" cy="708660"/>
+            </a:xfrm>
+          </p:grpSpPr>
+          <p:sp>
+            <p:nvSpPr>
+              <p:cNvPr id="14" name="Rectangle 13"/>
+              <p:cNvSpPr/>
+              <p:nvPr/>
+            </p:nvSpPr>
+            <p:spPr>
+              <a:xfrm>
+                <a:off x="4838700" y="1335845"/>
+                <a:ext cx="1226820" cy="508195"/>
+              </a:xfrm>
+              <a:prstGeom prst="rect">
+                <a:avLst/>
+              </a:prstGeom>
+              <a:noFill/>
+              <a:ln w="19050"/>
+            </p:spPr>
+            <p:style>
+              <a:lnRef idx="2">
+                <a:schemeClr val="accent1">
+                  <a:shade val="50000"/>
+                </a:schemeClr>
+              </a:lnRef>
+              <a:fillRef idx="1">
+                <a:schemeClr val="accent1"/>
+              </a:fillRef>
+              <a:effectRef idx="0">
+                <a:schemeClr val="accent1"/>
+              </a:effectRef>
+              <a:fontRef idx="minor">
+                <a:schemeClr val="lt1"/>
+              </a:fontRef>
+            </p:style>
+            <p:txBody>
+              <a:bodyPr rot="0" spcFirstLastPara="0" vertOverflow="overflow" horzOverflow="overflow" vert="horz" wrap="square" lIns="91440" tIns="45720" rIns="91440" bIns="45720" numCol="1" spcCol="0" rtlCol="0" fromWordArt="0" anchor="t" anchorCtr="0" forceAA="0" compatLnSpc="1">
+                <a:prstTxWarp prst="textNoShape">
+                  <a:avLst/>
+                </a:prstTxWarp>
+                <a:noAutofit/>
+              </a:bodyPr>
+              <a:lstStyle/>
+              <a:p>
+                <a:r>
+                  <a:rPr lang="en-US" sz="800" dirty="0" smtClean="0">
+                    <a:solidFill>
+                      <a:schemeClr val="accent1">
+                        <a:lumMod val="50000"/>
+                      </a:schemeClr>
+                    </a:solidFill>
+                  </a:rPr>
+                  <a:t>Key:  “</a:t>
+                </a:r>
+                <a:r>
+                  <a:rPr lang="en-US" sz="800" dirty="0" err="1">
+                    <a:solidFill>
+                      <a:schemeClr val="accent1">
+                        <a:lumMod val="50000"/>
+                      </a:schemeClr>
+                    </a:solidFill>
+                  </a:rPr>
+                  <a:t>B</a:t>
+                </a:r>
+                <a:r>
+                  <a:rPr lang="en-US" sz="800" dirty="0" err="1" smtClean="0">
+                    <a:solidFill>
+                      <a:schemeClr val="accent1">
+                        <a:lumMod val="50000"/>
+                      </a:schemeClr>
+                    </a:solidFill>
+                  </a:rPr>
+                  <a:t>Key</a:t>
+                </a:r>
+                <a:r>
+                  <a:rPr lang="en-US" sz="800" dirty="0" smtClean="0">
+                    <a:solidFill>
+                      <a:schemeClr val="accent1">
+                        <a:lumMod val="50000"/>
+                      </a:schemeClr>
+                    </a:solidFill>
+                  </a:rPr>
+                  <a:t>”</a:t>
+                </a:r>
+              </a:p>
+              <a:p>
+                <a:r>
+                  <a:rPr lang="en-US" sz="800" dirty="0" smtClean="0">
+                    <a:solidFill>
+                      <a:schemeClr val="accent1">
+                        <a:lumMod val="50000"/>
+                      </a:schemeClr>
+                    </a:solidFill>
+                  </a:rPr>
+                  <a:t>Value: “</a:t>
+                </a:r>
+                <a:r>
+                  <a:rPr lang="en-US" sz="800" dirty="0" err="1">
+                    <a:solidFill>
+                      <a:schemeClr val="accent1">
+                        <a:lumMod val="50000"/>
+                      </a:schemeClr>
+                    </a:solidFill>
+                  </a:rPr>
+                  <a:t>B</a:t>
+                </a:r>
+                <a:r>
+                  <a:rPr lang="en-US" sz="800" dirty="0" err="1" smtClean="0">
+                    <a:solidFill>
+                      <a:schemeClr val="accent1">
+                        <a:lumMod val="50000"/>
+                      </a:schemeClr>
+                    </a:solidFill>
+                  </a:rPr>
+                  <a:t>value</a:t>
+                </a:r>
+                <a:r>
+                  <a:rPr lang="en-US" sz="800" dirty="0" smtClean="0">
+                    <a:solidFill>
+                      <a:schemeClr val="accent1">
+                        <a:lumMod val="50000"/>
+                      </a:schemeClr>
+                    </a:solidFill>
+                  </a:rPr>
+                  <a:t>”</a:t>
+                </a:r>
+                <a:endParaRPr lang="en-US" sz="800" dirty="0" smtClean="0">
+                  <a:solidFill>
+                    <a:schemeClr val="accent1">
+                      <a:lumMod val="50000"/>
+                    </a:schemeClr>
+                  </a:solidFill>
+                </a:endParaRPr>
+              </a:p>
+            </p:txBody>
+          </p:sp>
+          <p:sp>
+            <p:nvSpPr>
+              <p:cNvPr id="15" name="Rectangle 14"/>
+              <p:cNvSpPr/>
+              <p:nvPr/>
+            </p:nvSpPr>
+            <p:spPr>
+              <a:xfrm>
+                <a:off x="4838700" y="1135380"/>
+                <a:ext cx="1226820" cy="200465"/>
+              </a:xfrm>
+              <a:prstGeom prst="rect">
+                <a:avLst/>
+              </a:prstGeom>
+              <a:noFill/>
+              <a:ln w="19050"/>
+            </p:spPr>
+            <p:style>
+              <a:lnRef idx="2">
+                <a:schemeClr val="accent1">
+                  <a:shade val="50000"/>
+                </a:schemeClr>
+              </a:lnRef>
+              <a:fillRef idx="1">
+                <a:schemeClr val="accent1"/>
+              </a:fillRef>
+              <a:effectRef idx="0">
+                <a:schemeClr val="accent1"/>
+              </a:effectRef>
+              <a:fontRef idx="minor">
+                <a:schemeClr val="lt1"/>
+              </a:fontRef>
+            </p:style>
+            <p:txBody>
+              <a:bodyPr rot="0" spcFirstLastPara="0" vertOverflow="overflow" horzOverflow="overflow" vert="horz" wrap="square" lIns="91440" tIns="45720" rIns="91440" bIns="45720" numCol="1" spcCol="0" rtlCol="0" fromWordArt="0" anchor="ctr" anchorCtr="0" forceAA="0" compatLnSpc="1">
+                <a:prstTxWarp prst="textNoShape">
+                  <a:avLst/>
+                </a:prstTxWarp>
+                <a:noAutofit/>
+              </a:bodyPr>
+              <a:lstStyle/>
+              <a:p>
+                <a:r>
+                  <a:rPr lang="en-US" sz="800" dirty="0" err="1" smtClean="0">
+                    <a:solidFill>
+                      <a:schemeClr val="accent1">
+                        <a:lumMod val="50000"/>
+                      </a:schemeClr>
+                    </a:solidFill>
+                  </a:rPr>
+                  <a:t>KVPair</a:t>
+                </a:r>
+                <a:r>
+                  <a:rPr lang="en-US" sz="800" dirty="0" smtClean="0">
+                    <a:solidFill>
+                      <a:schemeClr val="accent1">
+                        <a:lumMod val="50000"/>
+                      </a:schemeClr>
+                    </a:solidFill>
+                  </a:rPr>
+                  <a:t>	OID:  3-2-4-14</a:t>
+                </a:r>
+                <a:endParaRPr lang="en-US" sz="800" dirty="0" smtClean="0">
+                  <a:solidFill>
+                    <a:schemeClr val="accent1">
+                      <a:lumMod val="50000"/>
+                    </a:schemeClr>
+                  </a:solidFill>
+                </a:endParaRPr>
+              </a:p>
+            </p:txBody>
+          </p:sp>
+        </p:grpSp>
+        <p:grpSp>
+          <p:nvGrpSpPr>
+            <p:cNvPr id="22" name="Group 21"/>
+            <p:cNvGrpSpPr/>
+            <p:nvPr/>
+          </p:nvGrpSpPr>
+          <p:grpSpPr>
+            <a:xfrm>
+              <a:off x="1288675" y="1456443"/>
+              <a:ext cx="2494431" cy="1533610"/>
+              <a:chOff x="1297640" y="1135380"/>
+              <a:chExt cx="2494431" cy="1533610"/>
+            </a:xfrm>
+          </p:grpSpPr>
+          <p:grpSp>
+            <p:nvGrpSpPr>
+              <p:cNvPr id="10" name="Group 9"/>
+              <p:cNvGrpSpPr/>
+              <p:nvPr/>
+            </p:nvGrpSpPr>
+            <p:grpSpPr>
+              <a:xfrm>
+                <a:off x="1297640" y="1135380"/>
+                <a:ext cx="2494431" cy="1533610"/>
+                <a:chOff x="4838700" y="1135380"/>
+                <a:chExt cx="1226820" cy="708660"/>
+              </a:xfrm>
+            </p:grpSpPr>
+            <p:sp>
+              <p:nvSpPr>
+                <p:cNvPr id="11" name="Rectangle 10"/>
+                <p:cNvSpPr/>
+                <p:nvPr/>
+              </p:nvSpPr>
+              <p:spPr>
+                <a:xfrm>
+                  <a:off x="4838700" y="1335845"/>
+                  <a:ext cx="1226820" cy="508195"/>
+                </a:xfrm>
+                <a:prstGeom prst="rect">
+                  <a:avLst/>
+                </a:prstGeom>
+                <a:noFill/>
+                <a:ln w="19050"/>
+              </p:spPr>
+              <p:style>
+                <a:lnRef idx="2">
+                  <a:schemeClr val="accent1">
+                    <a:shade val="50000"/>
+                  </a:schemeClr>
+                </a:lnRef>
+                <a:fillRef idx="1">
+                  <a:schemeClr val="accent1"/>
+                </a:fillRef>
+                <a:effectRef idx="0">
+                  <a:schemeClr val="accent1"/>
+                </a:effectRef>
+                <a:fontRef idx="minor">
+                  <a:schemeClr val="lt1"/>
+                </a:fontRef>
+              </p:style>
+              <p:txBody>
+                <a:bodyPr rot="0" spcFirstLastPara="0" vertOverflow="overflow" horzOverflow="overflow" vert="horz" wrap="square" lIns="91440" tIns="45720" rIns="91440" bIns="45720" numCol="1" spcCol="0" rtlCol="0" fromWordArt="0" anchor="t" anchorCtr="0" forceAA="0" compatLnSpc="1">
+                  <a:prstTxWarp prst="textNoShape">
+                    <a:avLst/>
+                  </a:prstTxWarp>
+                  <a:noAutofit/>
+                </a:bodyPr>
+                <a:lstStyle/>
+                <a:p>
+                  <a:r>
+                    <a:rPr lang="en-US" sz="800" dirty="0" err="1" smtClean="0">
+                      <a:solidFill>
+                        <a:schemeClr val="accent1">
+                          <a:lumMod val="50000"/>
+                        </a:schemeClr>
+                      </a:solidFill>
+                    </a:rPr>
+                    <a:t>MyName</a:t>
+                  </a:r>
+                  <a:r>
+                    <a:rPr lang="en-US" sz="800" dirty="0" smtClean="0">
+                      <a:solidFill>
+                        <a:schemeClr val="accent1">
+                          <a:lumMod val="50000"/>
+                        </a:schemeClr>
+                      </a:solidFill>
+                    </a:rPr>
+                    <a:t>:  “</a:t>
+                  </a:r>
+                  <a:r>
+                    <a:rPr lang="en-US" sz="800" dirty="0" err="1" smtClean="0">
+                      <a:solidFill>
+                        <a:schemeClr val="accent1">
+                          <a:lumMod val="50000"/>
+                        </a:schemeClr>
+                      </a:solidFill>
+                    </a:rPr>
+                    <a:t>nameValue</a:t>
+                  </a:r>
+                  <a:r>
+                    <a:rPr lang="en-US" sz="800" dirty="0" smtClean="0">
+                      <a:solidFill>
+                        <a:schemeClr val="accent1">
+                          <a:lumMod val="50000"/>
+                        </a:schemeClr>
+                      </a:solidFill>
+                    </a:rPr>
+                    <a:t>”</a:t>
+                  </a:r>
+                </a:p>
+                <a:p>
+                  <a:r>
+                    <a:rPr lang="en-US" sz="800" dirty="0" err="1" smtClean="0">
+                      <a:solidFill>
+                        <a:schemeClr val="accent1">
+                          <a:lumMod val="50000"/>
+                        </a:schemeClr>
+                      </a:solidFill>
+                    </a:rPr>
+                    <a:t>MyMap</a:t>
+                  </a:r>
+                  <a:r>
+                    <a:rPr lang="en-US" sz="800" dirty="0" smtClean="0">
+                      <a:solidFill>
+                        <a:schemeClr val="accent1">
+                          <a:lumMod val="50000"/>
+                        </a:schemeClr>
+                      </a:solidFill>
+                    </a:rPr>
+                    <a:t>:      {</a:t>
+                  </a:r>
+                </a:p>
+                <a:p>
+                  <a:r>
+                    <a:rPr lang="en-US" sz="800" dirty="0" smtClean="0">
+                      <a:solidFill>
+                        <a:schemeClr val="accent1">
+                          <a:lumMod val="50000"/>
+                        </a:schemeClr>
+                      </a:solidFill>
+                    </a:rPr>
+                    <a:t>	{ “</a:t>
+                  </a:r>
+                  <a:r>
+                    <a:rPr lang="en-US" sz="800" dirty="0" err="1" smtClean="0">
+                      <a:solidFill>
+                        <a:schemeClr val="accent1">
+                          <a:lumMod val="50000"/>
+                        </a:schemeClr>
+                      </a:solidFill>
+                    </a:rPr>
+                    <a:t>Akey</a:t>
+                  </a:r>
+                  <a:r>
+                    <a:rPr lang="en-US" sz="800" dirty="0" smtClean="0">
+                      <a:solidFill>
+                        <a:schemeClr val="accent1">
+                          <a:lumMod val="50000"/>
+                        </a:schemeClr>
+                      </a:solidFill>
+                    </a:rPr>
+                    <a:t>”, 3-2-4-10 },</a:t>
+                  </a:r>
+                  <a:endParaRPr lang="en-US" sz="800" dirty="0">
+                    <a:solidFill>
+                      <a:schemeClr val="accent1">
+                        <a:lumMod val="50000"/>
+                      </a:schemeClr>
+                    </a:solidFill>
+                  </a:endParaRPr>
+                </a:p>
+                <a:p>
+                  <a:r>
+                    <a:rPr lang="en-US" sz="800" dirty="0">
+                      <a:solidFill>
+                        <a:schemeClr val="accent1">
+                          <a:lumMod val="50000"/>
+                        </a:schemeClr>
+                      </a:solidFill>
+                    </a:rPr>
+                    <a:t>	{ </a:t>
+                  </a:r>
+                  <a:r>
+                    <a:rPr lang="en-US" sz="800" dirty="0" smtClean="0">
+                      <a:solidFill>
+                        <a:schemeClr val="accent1">
+                          <a:lumMod val="50000"/>
+                        </a:schemeClr>
+                      </a:solidFill>
+                    </a:rPr>
+                    <a:t>“</a:t>
+                  </a:r>
+                  <a:r>
+                    <a:rPr lang="en-US" sz="800" dirty="0" err="1" smtClean="0">
+                      <a:solidFill>
+                        <a:schemeClr val="accent1">
+                          <a:lumMod val="50000"/>
+                        </a:schemeClr>
+                      </a:solidFill>
+                    </a:rPr>
+                    <a:t>Bkey</a:t>
+                  </a:r>
+                  <a:r>
+                    <a:rPr lang="en-US" sz="800" dirty="0">
+                      <a:solidFill>
+                        <a:schemeClr val="accent1">
+                          <a:lumMod val="50000"/>
+                        </a:schemeClr>
+                      </a:solidFill>
+                    </a:rPr>
+                    <a:t>”, </a:t>
+                  </a:r>
+                  <a:r>
+                    <a:rPr lang="en-US" sz="800" dirty="0" smtClean="0">
+                      <a:solidFill>
+                        <a:schemeClr val="accent1">
+                          <a:lumMod val="50000"/>
+                        </a:schemeClr>
+                      </a:solidFill>
+                    </a:rPr>
+                    <a:t>3-2-4-14 </a:t>
+                  </a:r>
+                  <a:r>
+                    <a:rPr lang="en-US" sz="800" dirty="0">
+                      <a:solidFill>
+                        <a:schemeClr val="accent1">
+                          <a:lumMod val="50000"/>
+                        </a:schemeClr>
+                      </a:solidFill>
+                    </a:rPr>
+                    <a:t>}</a:t>
+                  </a:r>
+                </a:p>
+                <a:p>
+                  <a:r>
+                    <a:rPr lang="en-US" sz="800" dirty="0">
+                      <a:solidFill>
+                        <a:schemeClr val="accent1">
+                          <a:lumMod val="50000"/>
+                        </a:schemeClr>
+                      </a:solidFill>
+                    </a:rPr>
+                    <a:t> </a:t>
+                  </a:r>
+                  <a:r>
+                    <a:rPr lang="en-US" sz="800" dirty="0" smtClean="0">
+                      <a:solidFill>
+                        <a:schemeClr val="accent1">
+                          <a:lumMod val="50000"/>
+                        </a:schemeClr>
+                      </a:solidFill>
+                    </a:rPr>
+                    <a:t>                     </a:t>
+                  </a:r>
+                  <a:r>
+                    <a:rPr lang="en-US" sz="800" dirty="0" smtClean="0">
+                      <a:solidFill>
+                        <a:schemeClr val="accent1">
+                          <a:lumMod val="50000"/>
+                        </a:schemeClr>
+                      </a:solidFill>
+                    </a:rPr>
+                    <a:t>}</a:t>
+                  </a:r>
+                  <a:endParaRPr lang="en-US" sz="800" dirty="0" smtClean="0">
+                    <a:solidFill>
+                      <a:schemeClr val="accent1">
+                        <a:lumMod val="50000"/>
+                      </a:schemeClr>
+                    </a:solidFill>
+                  </a:endParaRPr>
+                </a:p>
+              </p:txBody>
+            </p:sp>
+            <p:sp>
+              <p:nvSpPr>
+                <p:cNvPr id="12" name="Rectangle 11"/>
+                <p:cNvSpPr/>
+                <p:nvPr/>
+              </p:nvSpPr>
+              <p:spPr>
+                <a:xfrm>
+                  <a:off x="4838700" y="1135380"/>
+                  <a:ext cx="1226820" cy="200465"/>
+                </a:xfrm>
+                <a:prstGeom prst="rect">
+                  <a:avLst/>
+                </a:prstGeom>
+                <a:noFill/>
+                <a:ln w="19050"/>
+              </p:spPr>
+              <p:style>
+                <a:lnRef idx="2">
+                  <a:schemeClr val="accent1">
+                    <a:shade val="50000"/>
+                  </a:schemeClr>
+                </a:lnRef>
+                <a:fillRef idx="1">
+                  <a:schemeClr val="accent1"/>
+                </a:fillRef>
+                <a:effectRef idx="0">
+                  <a:schemeClr val="accent1"/>
+                </a:effectRef>
+                <a:fontRef idx="minor">
+                  <a:schemeClr val="lt1"/>
+                </a:fontRef>
+              </p:style>
+              <p:txBody>
+                <a:bodyPr rot="0" spcFirstLastPara="0" vertOverflow="overflow" horzOverflow="overflow" vert="horz" wrap="square" lIns="91440" tIns="45720" rIns="91440" bIns="45720" numCol="1" spcCol="0" rtlCol="0" fromWordArt="0" anchor="ctr" anchorCtr="0" forceAA="0" compatLnSpc="1">
+                  <a:prstTxWarp prst="textNoShape">
+                    <a:avLst/>
+                  </a:prstTxWarp>
+                  <a:noAutofit/>
+                </a:bodyPr>
+                <a:lstStyle/>
+                <a:p>
+                  <a:r>
+                    <a:rPr lang="en-US" sz="800" dirty="0" err="1" smtClean="0">
+                      <a:solidFill>
+                        <a:schemeClr val="accent1">
+                          <a:lumMod val="50000"/>
+                        </a:schemeClr>
+                      </a:solidFill>
+                    </a:rPr>
+                    <a:t>MyType</a:t>
+                  </a:r>
+                  <a:r>
+                    <a:rPr lang="en-US" sz="800" dirty="0" smtClean="0">
+                      <a:solidFill>
+                        <a:schemeClr val="accent1">
+                          <a:lumMod val="50000"/>
+                        </a:schemeClr>
+                      </a:solidFill>
+                    </a:rPr>
+                    <a:t>	OID:  3-2-2-18</a:t>
+                  </a:r>
+                  <a:endParaRPr lang="en-US" sz="800" dirty="0" smtClean="0">
+                    <a:solidFill>
+                      <a:schemeClr val="accent1">
+                        <a:lumMod val="50000"/>
+                      </a:schemeClr>
+                    </a:solidFill>
+                  </a:endParaRPr>
+                </a:p>
+              </p:txBody>
+            </p:sp>
+          </p:grpSp>
+          <p:sp>
+            <p:nvSpPr>
+              <p:cNvPr id="16" name="Rectangle 15"/>
+              <p:cNvSpPr/>
+              <p:nvPr/>
+            </p:nvSpPr>
+            <p:spPr>
+              <a:xfrm>
+                <a:off x="3164542" y="1971815"/>
+                <a:ext cx="322729" cy="89647"/>
+              </a:xfrm>
+              <a:prstGeom prst="rect">
+                <a:avLst/>
+              </a:prstGeom>
+              <a:noFill/>
+              <a:ln w="9525">
+                <a:noFill/>
+              </a:ln>
+            </p:spPr>
+            <p:style>
+              <a:lnRef idx="2">
+                <a:schemeClr val="accent1">
+                  <a:shade val="50000"/>
+                </a:schemeClr>
+              </a:lnRef>
+              <a:fillRef idx="1">
+                <a:schemeClr val="accent1"/>
+              </a:fillRef>
+              <a:effectRef idx="0">
+                <a:schemeClr val="accent1"/>
+              </a:effectRef>
+              <a:fontRef idx="minor">
+                <a:schemeClr val="lt1"/>
+              </a:fontRef>
+            </p:style>
+            <p:txBody>
+              <a:bodyPr rot="0" spcFirstLastPara="0" vertOverflow="overflow" horzOverflow="overflow" vert="horz" wrap="square" lIns="91440" tIns="45720" rIns="91440" bIns="45720" numCol="1" spcCol="0" rtlCol="0" fromWordArt="0" anchor="ctr" anchorCtr="0" forceAA="0" compatLnSpc="1">
+                <a:prstTxWarp prst="textNoShape">
+                  <a:avLst/>
+                </a:prstTxWarp>
+                <a:noAutofit/>
+              </a:bodyPr>
+              <a:lstStyle/>
+              <a:p>
+                <a:pPr algn="ctr"/>
+                <a:endParaRPr lang="en-US" sz="800" dirty="0" err="1" smtClean="0">
+                  <a:solidFill>
+                    <a:schemeClr val="accent1">
+                      <a:lumMod val="50000"/>
+                    </a:schemeClr>
+                  </a:solidFill>
+                </a:endParaRPr>
+              </a:p>
+            </p:txBody>
+          </p:sp>
+          <p:sp>
+            <p:nvSpPr>
+              <p:cNvPr id="17" name="Rectangle 16"/>
+              <p:cNvSpPr/>
+              <p:nvPr/>
+            </p:nvSpPr>
+            <p:spPr>
+              <a:xfrm>
+                <a:off x="3164542" y="2133601"/>
+                <a:ext cx="322729" cy="89647"/>
+              </a:xfrm>
+              <a:prstGeom prst="rect">
+                <a:avLst/>
+              </a:prstGeom>
+              <a:noFill/>
+              <a:ln w="9525">
+                <a:noFill/>
+              </a:ln>
+            </p:spPr>
+            <p:style>
+              <a:lnRef idx="2">
+                <a:schemeClr val="accent1">
+                  <a:shade val="50000"/>
+                </a:schemeClr>
+              </a:lnRef>
+              <a:fillRef idx="1">
+                <a:schemeClr val="accent1"/>
+              </a:fillRef>
+              <a:effectRef idx="0">
+                <a:schemeClr val="accent1"/>
+              </a:effectRef>
+              <a:fontRef idx="minor">
+                <a:schemeClr val="lt1"/>
+              </a:fontRef>
+            </p:style>
+            <p:txBody>
+              <a:bodyPr rot="0" spcFirstLastPara="0" vertOverflow="overflow" horzOverflow="overflow" vert="horz" wrap="square" lIns="91440" tIns="45720" rIns="91440" bIns="45720" numCol="1" spcCol="0" rtlCol="0" fromWordArt="0" anchor="ctr" anchorCtr="0" forceAA="0" compatLnSpc="1">
+                <a:prstTxWarp prst="textNoShape">
+                  <a:avLst/>
+                </a:prstTxWarp>
+                <a:noAutofit/>
+              </a:bodyPr>
+              <a:lstStyle/>
+              <a:p>
+                <a:pPr algn="ctr"/>
+                <a:endParaRPr lang="en-US" sz="800" dirty="0" err="1" smtClean="0">
+                  <a:solidFill>
+                    <a:schemeClr val="accent1">
+                      <a:lumMod val="50000"/>
+                    </a:schemeClr>
+                  </a:solidFill>
+                </a:endParaRPr>
+              </a:p>
+            </p:txBody>
+          </p:sp>
+        </p:grpSp>
+        <p:cxnSp>
+          <p:nvCxnSpPr>
+            <p:cNvPr id="19" name="Elbow Connector 18"/>
+            <p:cNvCxnSpPr>
+              <a:stCxn id="16" idx="3"/>
+              <a:endCxn id="7" idx="1"/>
+            </p:cNvCxnSpPr>
+            <p:nvPr/>
+          </p:nvCxnSpPr>
+          <p:spPr>
+            <a:xfrm flipV="1">
+              <a:off x="3478306" y="1704136"/>
+              <a:ext cx="1665191" cy="633566"/>
+            </a:xfrm>
+            <a:prstGeom prst="bentConnector3">
+              <a:avLst/>
+            </a:prstGeom>
+            <a:ln w="28575">
+              <a:solidFill>
+                <a:schemeClr val="accent1"/>
+              </a:solidFill>
+              <a:headEnd type="none" w="med" len="med"/>
+              <a:tailEnd type="triangle"/>
+            </a:ln>
+          </p:spPr>
+          <p:style>
+            <a:lnRef idx="1">
+              <a:schemeClr val="accent1"/>
+            </a:lnRef>
+            <a:fillRef idx="0">
+              <a:schemeClr val="accent1"/>
+            </a:fillRef>
+            <a:effectRef idx="0">
+              <a:schemeClr val="accent1"/>
+            </a:effectRef>
+            <a:fontRef idx="minor">
+              <a:schemeClr val="tx1"/>
+            </a:fontRef>
+          </p:style>
+        </p:cxnSp>
+        <p:cxnSp>
+          <p:nvCxnSpPr>
+            <p:cNvPr id="21" name="Elbow Connector 20"/>
+            <p:cNvCxnSpPr>
+              <a:stCxn id="17" idx="3"/>
+              <a:endCxn id="15" idx="1"/>
+            </p:cNvCxnSpPr>
+            <p:nvPr/>
+          </p:nvCxnSpPr>
+          <p:spPr>
+            <a:xfrm>
+              <a:off x="3478306" y="2499488"/>
+              <a:ext cx="1665190" cy="659648"/>
+            </a:xfrm>
+            <a:prstGeom prst="bentConnector3">
+              <a:avLst/>
+            </a:prstGeom>
+            <a:ln w="28575">
+              <a:solidFill>
+                <a:schemeClr val="accent1"/>
+              </a:solidFill>
+              <a:headEnd type="none" w="med" len="med"/>
+              <a:tailEnd type="triangle"/>
+            </a:ln>
+          </p:spPr>
+          <p:style>
+            <a:lnRef idx="1">
+              <a:schemeClr val="accent1"/>
+            </a:lnRef>
+            <a:fillRef idx="0">
+              <a:schemeClr val="accent1"/>
+            </a:fillRef>
+            <a:effectRef idx="0">
+              <a:schemeClr val="accent1"/>
+            </a:effectRef>
+            <a:fontRef idx="minor">
+              <a:schemeClr val="tx1"/>
+            </a:fontRef>
+          </p:style>
+        </p:cxnSp>
+      </p:grpSp>
+    </p:spTree>
+    <p:extLst>
+      <p:ext uri="{BB962C8B-B14F-4D97-AF65-F5344CB8AC3E}">
+        <p14:creationId xmlns:p14="http://schemas.microsoft.com/office/powerpoint/2010/main" val="1968350018"/>
       </p:ext>
     </p:extLst>
   </p:cSld>
@@ -15188,7 +16167,7 @@
         <a:noFill/>
         <a:ln w="9525"/>
       </a:spPr>
-      <a:bodyPr rot="0" spcFirstLastPara="0" vertOverflow="overflow" horzOverflow="overflow" vert="horz" wrap="square" lIns="91440" tIns="45720" rIns="91440" bIns="45720" numCol="1" spcCol="0" rtlCol="0" fromWordArt="0" anchor="ctr" anchorCtr="0" forceAA="0" compatLnSpc="1">
+      <a:bodyPr rot="0" spcFirstLastPara="0" vertOverflow="overflow" horzOverflow="overflow" vert="horz" wrap="square" lIns="91440" tIns="45720" rIns="91440" bIns="45720" numCol="1" spcCol="0" rtlCol="0" fromWordArt="0" anchor="t" anchorCtr="0" forceAA="0" compatLnSpc="1">
         <a:prstTxWarp prst="textNoShape">
           <a:avLst/>
         </a:prstTxWarp>
@@ -15196,7 +16175,7 @@
       </a:bodyPr>
       <a:lstStyle>
         <a:defPPr algn="ctr">
-          <a:defRPr dirty="0" err="1" smtClean="0">
+          <a:defRPr dirty="0" smtClean="0">
             <a:solidFill>
               <a:schemeClr val="accent1">
                 <a:lumMod val="50000"/>
@@ -15224,12 +16203,12 @@
     </a:spDef>
     <a:lnDef>
       <a:spPr>
-        <a:ln w="12700">
+        <a:ln w="28575">
           <a:solidFill>
-            <a:schemeClr val="tx1"/>
+            <a:schemeClr val="accent1"/>
           </a:solidFill>
           <a:headEnd type="none" w="med" len="med"/>
-          <a:tailEnd type="arrow" w="med" len="med"/>
+          <a:tailEnd type="triangle"/>
         </a:ln>
       </a:spPr>
       <a:bodyPr/>

</xml_diff>